<commit_message>
Problema de caminos con trancones.pptx
</commit_message>
<xml_diff>
--- a/Problema de caminos con trancones.pptx
+++ b/Problema de caminos con trancones.pptx
@@ -8,6 +8,8 @@
     <p:sldId id="256" r:id="rId2"/>
     <p:sldId id="257" r:id="rId3"/>
     <p:sldId id="258" r:id="rId4"/>
+    <p:sldId id="259" r:id="rId5"/>
+    <p:sldId id="260" r:id="rId6"/>
   </p:sldIdLst>
   <p:sldSz cx="12192000" cy="6858000"/>
   <p:notesSz cx="6858000" cy="9144000"/>
@@ -106,6 +108,11 @@
       </a:defRPr>
     </a:lvl9pPr>
   </p:defaultTextStyle>
+  <p:extLst>
+    <p:ext uri="{EFAFB233-063F-42B5-8137-9DF3F51BA10A}">
+      <p15:sldGuideLst xmlns:p15="http://schemas.microsoft.com/office/powerpoint/2012/main"/>
+    </p:ext>
+  </p:extLst>
 </p:presentation>
 </file>
 
@@ -298,7 +305,7 @@
             <a:fld id="{B61BEF0D-F0BB-DE4B-95CE-6DB70DBA9567}" type="datetimeFigureOut">
               <a:rPr lang="en-US" dirty="0"/>
               <a:pPr/>
-              <a:t>9/8/2018</a:t>
+              <a:t>9/9/2018</a:t>
             </a:fld>
             <a:endParaRPr lang="en-US" dirty="0"/>
           </a:p>
@@ -633,7 +640,7 @@
             <a:fld id="{B61BEF0D-F0BB-DE4B-95CE-6DB70DBA9567}" type="datetimeFigureOut">
               <a:rPr lang="en-US" dirty="0"/>
               <a:pPr/>
-              <a:t>9/8/2018</a:t>
+              <a:t>9/9/2018</a:t>
             </a:fld>
             <a:endParaRPr lang="en-US" dirty="0"/>
           </a:p>
@@ -1031,7 +1038,7 @@
             <a:fld id="{B61BEF0D-F0BB-DE4B-95CE-6DB70DBA9567}" type="datetimeFigureOut">
               <a:rPr lang="en-US" dirty="0"/>
               <a:pPr/>
-              <a:t>9/8/2018</a:t>
+              <a:t>9/9/2018</a:t>
             </a:fld>
             <a:endParaRPr lang="en-US" dirty="0"/>
           </a:p>
@@ -1364,7 +1371,7 @@
             <a:fld id="{B61BEF0D-F0BB-DE4B-95CE-6DB70DBA9567}" type="datetimeFigureOut">
               <a:rPr lang="en-US" dirty="0"/>
               <a:pPr/>
-              <a:t>9/8/2018</a:t>
+              <a:t>9/9/2018</a:t>
             </a:fld>
             <a:endParaRPr lang="en-US" dirty="0"/>
           </a:p>
@@ -1681,7 +1688,7 @@
             <a:fld id="{B61BEF0D-F0BB-DE4B-95CE-6DB70DBA9567}" type="datetimeFigureOut">
               <a:rPr lang="en-US" dirty="0"/>
               <a:pPr/>
-              <a:t>9/8/2018</a:t>
+              <a:t>9/9/2018</a:t>
             </a:fld>
             <a:endParaRPr lang="en-US" dirty="0"/>
           </a:p>
@@ -2074,7 +2081,7 @@
             <a:fld id="{B61BEF0D-F0BB-DE4B-95CE-6DB70DBA9567}" type="datetimeFigureOut">
               <a:rPr lang="en-US" dirty="0"/>
               <a:pPr/>
-              <a:t>9/8/2018</a:t>
+              <a:t>9/9/2018</a:t>
             </a:fld>
             <a:endParaRPr lang="en-US" dirty="0"/>
           </a:p>
@@ -2328,7 +2335,7 @@
             <a:fld id="{B61BEF0D-F0BB-DE4B-95CE-6DB70DBA9567}" type="datetimeFigureOut">
               <a:rPr lang="en-US" dirty="0"/>
               <a:pPr/>
-              <a:t>9/8/2018</a:t>
+              <a:t>9/9/2018</a:t>
             </a:fld>
             <a:endParaRPr lang="en-US" dirty="0"/>
           </a:p>
@@ -2587,7 +2594,7 @@
             <a:fld id="{B61BEF0D-F0BB-DE4B-95CE-6DB70DBA9567}" type="datetimeFigureOut">
               <a:rPr lang="en-US" dirty="0"/>
               <a:pPr/>
-              <a:t>9/8/2018</a:t>
+              <a:t>9/9/2018</a:t>
             </a:fld>
             <a:endParaRPr lang="en-US" dirty="0"/>
           </a:p>
@@ -2846,7 +2853,7 @@
             <a:fld id="{B61BEF0D-F0BB-DE4B-95CE-6DB70DBA9567}" type="datetimeFigureOut">
               <a:rPr lang="en-US" dirty="0"/>
               <a:pPr/>
-              <a:t>9/8/2018</a:t>
+              <a:t>9/9/2018</a:t>
             </a:fld>
             <a:endParaRPr lang="en-US" dirty="0"/>
           </a:p>
@@ -3172,7 +3179,7 @@
             <a:fld id="{B61BEF0D-F0BB-DE4B-95CE-6DB70DBA9567}" type="datetimeFigureOut">
               <a:rPr lang="en-US" dirty="0"/>
               <a:pPr/>
-              <a:t>9/8/2018</a:t>
+              <a:t>9/9/2018</a:t>
             </a:fld>
             <a:endParaRPr lang="en-US" dirty="0"/>
           </a:p>
@@ -3492,7 +3499,7 @@
             <a:fld id="{B61BEF0D-F0BB-DE4B-95CE-6DB70DBA9567}" type="datetimeFigureOut">
               <a:rPr lang="en-US" dirty="0"/>
               <a:pPr/>
-              <a:t>9/8/2018</a:t>
+              <a:t>9/9/2018</a:t>
             </a:fld>
             <a:endParaRPr lang="en-US" dirty="0"/>
           </a:p>
@@ -3946,7 +3953,7 @@
             <a:fld id="{B61BEF0D-F0BB-DE4B-95CE-6DB70DBA9567}" type="datetimeFigureOut">
               <a:rPr lang="en-US" dirty="0"/>
               <a:pPr/>
-              <a:t>9/8/2018</a:t>
+              <a:t>9/9/2018</a:t>
             </a:fld>
             <a:endParaRPr lang="en-US" dirty="0"/>
           </a:p>
@@ -4148,7 +4155,7 @@
             <a:fld id="{B61BEF0D-F0BB-DE4B-95CE-6DB70DBA9567}" type="datetimeFigureOut">
               <a:rPr lang="en-US" dirty="0"/>
               <a:pPr/>
-              <a:t>9/8/2018</a:t>
+              <a:t>9/9/2018</a:t>
             </a:fld>
             <a:endParaRPr lang="en-US" dirty="0"/>
           </a:p>
@@ -4322,7 +4329,7 @@
             <a:fld id="{B61BEF0D-F0BB-DE4B-95CE-6DB70DBA9567}" type="datetimeFigureOut">
               <a:rPr lang="en-US" dirty="0"/>
               <a:pPr/>
-              <a:t>9/8/2018</a:t>
+              <a:t>9/9/2018</a:t>
             </a:fld>
             <a:endParaRPr lang="en-US" dirty="0"/>
           </a:p>
@@ -4652,7 +4659,7 @@
             <a:fld id="{B61BEF0D-F0BB-DE4B-95CE-6DB70DBA9567}" type="datetimeFigureOut">
               <a:rPr lang="en-US" dirty="0"/>
               <a:pPr/>
-              <a:t>9/8/2018</a:t>
+              <a:t>9/9/2018</a:t>
             </a:fld>
             <a:endParaRPr lang="en-US" dirty="0"/>
           </a:p>
@@ -4994,7 +5001,7 @@
             <a:fld id="{B61BEF0D-F0BB-DE4B-95CE-6DB70DBA9567}" type="datetimeFigureOut">
               <a:rPr lang="en-US" dirty="0"/>
               <a:pPr/>
-              <a:t>9/8/2018</a:t>
+              <a:t>9/9/2018</a:t>
             </a:fld>
             <a:endParaRPr lang="en-US" dirty="0"/>
           </a:p>
@@ -7108,7 +7115,7 @@
             <a:fld id="{B61BEF0D-F0BB-DE4B-95CE-6DB70DBA9567}" type="datetimeFigureOut">
               <a:rPr lang="en-US" dirty="0"/>
               <a:pPr/>
-              <a:t>9/8/2018</a:t>
+              <a:t>9/9/2018</a:t>
             </a:fld>
             <a:endParaRPr lang="en-US" dirty="0"/>
           </a:p>
@@ -9460,7 +9467,7 @@
             </a:r>
             <a:r>
               <a:rPr lang="es-CO" b="1" dirty="0"/>
-              <a:t>¿ existe algún camino por el cual la persona pueda moverse de un punto u a un punto v ?</a:t>
+              <a:t>¿Existe algún camino por el cual la persona pueda moverse de un punto u a un punto v?</a:t>
             </a:r>
           </a:p>
         </p:txBody>
@@ -10441,6 +10448,2342 @@
     <p:extLst>
       <p:ext uri="{BB962C8B-B14F-4D97-AF65-F5344CB8AC3E}">
         <p14:creationId xmlns:p14="http://schemas.microsoft.com/office/powerpoint/2010/main" val="654922966"/>
+      </p:ext>
+    </p:extLst>
+  </p:cSld>
+  <p:clrMapOvr>
+    <a:masterClrMapping/>
+  </p:clrMapOvr>
+</p:sld>
+</file>
+
+<file path=ppt/slides/slide4.xml><?xml version="1.0" encoding="utf-8"?>
+<p:sld xmlns:a="http://schemas.openxmlformats.org/drawingml/2006/main" xmlns:r="http://schemas.openxmlformats.org/officeDocument/2006/relationships" xmlns:p="http://schemas.openxmlformats.org/presentationml/2006/main">
+  <p:cSld>
+    <p:spTree>
+      <p:nvGrpSpPr>
+        <p:cNvPr id="1" name=""/>
+        <p:cNvGrpSpPr/>
+        <p:nvPr/>
+      </p:nvGrpSpPr>
+      <p:grpSpPr>
+        <a:xfrm>
+          <a:off x="0" y="0"/>
+          <a:ext cx="0" cy="0"/>
+          <a:chOff x="0" y="0"/>
+          <a:chExt cx="0" cy="0"/>
+        </a:xfrm>
+      </p:grpSpPr>
+      <p:grpSp>
+        <p:nvGrpSpPr>
+          <p:cNvPr id="5" name="Grupo 4">
+            <a:extLst>
+              <a:ext uri="{FF2B5EF4-FFF2-40B4-BE49-F238E27FC236}">
+                <a16:creationId xmlns:a16="http://schemas.microsoft.com/office/drawing/2014/main" id="{394DDF05-E454-4F11-AB50-E1A41C3C8F68}"/>
+              </a:ext>
+            </a:extLst>
+          </p:cNvPr>
+          <p:cNvGrpSpPr/>
+          <p:nvPr/>
+        </p:nvGrpSpPr>
+        <p:grpSpPr>
+          <a:xfrm>
+            <a:off x="7579693" y="1325217"/>
+            <a:ext cx="3611220" cy="1610139"/>
+            <a:chOff x="8024193" y="1325217"/>
+            <a:chExt cx="3611220" cy="1610139"/>
+          </a:xfrm>
+        </p:grpSpPr>
+        <p:sp>
+          <p:nvSpPr>
+            <p:cNvPr id="43" name="Elipse 42">
+              <a:extLst>
+                <a:ext uri="{FF2B5EF4-FFF2-40B4-BE49-F238E27FC236}">
+                  <a16:creationId xmlns:a16="http://schemas.microsoft.com/office/drawing/2014/main" id="{AC0B517B-CEEF-4B41-8361-D865B28FFE9D}"/>
+                </a:ext>
+              </a:extLst>
+            </p:cNvPr>
+            <p:cNvSpPr/>
+            <p:nvPr/>
+          </p:nvSpPr>
+          <p:spPr>
+            <a:xfrm>
+              <a:off x="9634330" y="1325217"/>
+              <a:ext cx="490331" cy="463826"/>
+            </a:xfrm>
+            <a:prstGeom prst="ellipse">
+              <a:avLst/>
+            </a:prstGeom>
+            <a:noFill/>
+          </p:spPr>
+          <p:style>
+            <a:lnRef idx="2">
+              <a:schemeClr val="accent1">
+                <a:shade val="50000"/>
+              </a:schemeClr>
+            </a:lnRef>
+            <a:fillRef idx="1">
+              <a:schemeClr val="accent1"/>
+            </a:fillRef>
+            <a:effectRef idx="0">
+              <a:schemeClr val="accent1"/>
+            </a:effectRef>
+            <a:fontRef idx="minor">
+              <a:schemeClr val="lt1"/>
+            </a:fontRef>
+          </p:style>
+          <p:txBody>
+            <a:bodyPr rtlCol="0" anchor="ctr"/>
+            <a:lstStyle/>
+            <a:p>
+              <a:pPr algn="ctr"/>
+              <a:endParaRPr lang="es-CO"/>
+            </a:p>
+          </p:txBody>
+        </p:sp>
+        <p:cxnSp>
+          <p:nvCxnSpPr>
+            <p:cNvPr id="44" name="Conector recto 43">
+              <a:extLst>
+                <a:ext uri="{FF2B5EF4-FFF2-40B4-BE49-F238E27FC236}">
+                  <a16:creationId xmlns:a16="http://schemas.microsoft.com/office/drawing/2014/main" id="{4C31321C-939B-4CC5-BE5A-E5FF1ABB32F9}"/>
+                </a:ext>
+              </a:extLst>
+            </p:cNvPr>
+            <p:cNvCxnSpPr>
+              <a:stCxn id="43" idx="3"/>
+            </p:cNvCxnSpPr>
+            <p:nvPr/>
+          </p:nvCxnSpPr>
+          <p:spPr>
+            <a:xfrm flipH="1">
+              <a:off x="8256104" y="1721117"/>
+              <a:ext cx="1450033" cy="743787"/>
+            </a:xfrm>
+            <a:prstGeom prst="line">
+              <a:avLst/>
+            </a:prstGeom>
+          </p:spPr>
+          <p:style>
+            <a:lnRef idx="1">
+              <a:schemeClr val="accent1"/>
+            </a:lnRef>
+            <a:fillRef idx="0">
+              <a:schemeClr val="accent1"/>
+            </a:fillRef>
+            <a:effectRef idx="0">
+              <a:schemeClr val="accent1"/>
+            </a:effectRef>
+            <a:fontRef idx="minor">
+              <a:schemeClr val="tx1"/>
+            </a:fontRef>
+          </p:style>
+        </p:cxnSp>
+        <p:sp>
+          <p:nvSpPr>
+            <p:cNvPr id="46" name="Elipse 45">
+              <a:extLst>
+                <a:ext uri="{FF2B5EF4-FFF2-40B4-BE49-F238E27FC236}">
+                  <a16:creationId xmlns:a16="http://schemas.microsoft.com/office/drawing/2014/main" id="{347FC539-ED4A-4AD8-AE35-D0E111D6F9E8}"/>
+                </a:ext>
+              </a:extLst>
+            </p:cNvPr>
+            <p:cNvSpPr/>
+            <p:nvPr/>
+          </p:nvSpPr>
+          <p:spPr>
+            <a:xfrm>
+              <a:off x="8024193" y="2471530"/>
+              <a:ext cx="490331" cy="463826"/>
+            </a:xfrm>
+            <a:prstGeom prst="ellipse">
+              <a:avLst/>
+            </a:prstGeom>
+            <a:noFill/>
+          </p:spPr>
+          <p:style>
+            <a:lnRef idx="2">
+              <a:schemeClr val="accent1">
+                <a:shade val="50000"/>
+              </a:schemeClr>
+            </a:lnRef>
+            <a:fillRef idx="1">
+              <a:schemeClr val="accent1"/>
+            </a:fillRef>
+            <a:effectRef idx="0">
+              <a:schemeClr val="accent1"/>
+            </a:effectRef>
+            <a:fontRef idx="minor">
+              <a:schemeClr val="lt1"/>
+            </a:fontRef>
+          </p:style>
+          <p:txBody>
+            <a:bodyPr rtlCol="0" anchor="ctr"/>
+            <a:lstStyle/>
+            <a:p>
+              <a:pPr algn="ctr"/>
+              <a:endParaRPr lang="es-CO"/>
+            </a:p>
+          </p:txBody>
+        </p:sp>
+        <p:sp>
+          <p:nvSpPr>
+            <p:cNvPr id="47" name="Elipse 46">
+              <a:extLst>
+                <a:ext uri="{FF2B5EF4-FFF2-40B4-BE49-F238E27FC236}">
+                  <a16:creationId xmlns:a16="http://schemas.microsoft.com/office/drawing/2014/main" id="{75C578D5-9900-4CFC-A3FC-36C234B5D509}"/>
+                </a:ext>
+              </a:extLst>
+            </p:cNvPr>
+            <p:cNvSpPr/>
+            <p:nvPr/>
+          </p:nvSpPr>
+          <p:spPr>
+            <a:xfrm>
+              <a:off x="11145082" y="2372141"/>
+              <a:ext cx="490331" cy="463826"/>
+            </a:xfrm>
+            <a:prstGeom prst="ellipse">
+              <a:avLst/>
+            </a:prstGeom>
+            <a:noFill/>
+          </p:spPr>
+          <p:style>
+            <a:lnRef idx="2">
+              <a:schemeClr val="accent1">
+                <a:shade val="50000"/>
+              </a:schemeClr>
+            </a:lnRef>
+            <a:fillRef idx="1">
+              <a:schemeClr val="accent1"/>
+            </a:fillRef>
+            <a:effectRef idx="0">
+              <a:schemeClr val="accent1"/>
+            </a:effectRef>
+            <a:fontRef idx="minor">
+              <a:schemeClr val="lt1"/>
+            </a:fontRef>
+          </p:style>
+          <p:txBody>
+            <a:bodyPr rtlCol="0" anchor="ctr"/>
+            <a:lstStyle/>
+            <a:p>
+              <a:pPr algn="ctr"/>
+              <a:endParaRPr lang="es-CO"/>
+            </a:p>
+          </p:txBody>
+        </p:sp>
+      </p:grpSp>
+      <p:grpSp>
+        <p:nvGrpSpPr>
+          <p:cNvPr id="8" name="Grupo 7">
+            <a:extLst>
+              <a:ext uri="{FF2B5EF4-FFF2-40B4-BE49-F238E27FC236}">
+                <a16:creationId xmlns:a16="http://schemas.microsoft.com/office/drawing/2014/main" id="{B3491BFF-3BC1-42B6-AE2A-61F07461A0EE}"/>
+              </a:ext>
+            </a:extLst>
+          </p:cNvPr>
+          <p:cNvGrpSpPr/>
+          <p:nvPr/>
+        </p:nvGrpSpPr>
+        <p:grpSpPr>
+          <a:xfrm rot="10800000">
+            <a:off x="7579694" y="4022034"/>
+            <a:ext cx="3611219" cy="1610139"/>
+            <a:chOff x="8104425" y="1325217"/>
+            <a:chExt cx="3611219" cy="1610139"/>
+          </a:xfrm>
+        </p:grpSpPr>
+        <p:sp>
+          <p:nvSpPr>
+            <p:cNvPr id="32" name="Elipse 31">
+              <a:extLst>
+                <a:ext uri="{FF2B5EF4-FFF2-40B4-BE49-F238E27FC236}">
+                  <a16:creationId xmlns:a16="http://schemas.microsoft.com/office/drawing/2014/main" id="{F2F9B1BF-0939-4184-9984-1BFF66C8080A}"/>
+                </a:ext>
+              </a:extLst>
+            </p:cNvPr>
+            <p:cNvSpPr/>
+            <p:nvPr/>
+          </p:nvSpPr>
+          <p:spPr>
+            <a:xfrm>
+              <a:off x="9634330" y="1325217"/>
+              <a:ext cx="490331" cy="463826"/>
+            </a:xfrm>
+            <a:prstGeom prst="ellipse">
+              <a:avLst/>
+            </a:prstGeom>
+            <a:noFill/>
+          </p:spPr>
+          <p:style>
+            <a:lnRef idx="2">
+              <a:schemeClr val="accent1">
+                <a:shade val="50000"/>
+              </a:schemeClr>
+            </a:lnRef>
+            <a:fillRef idx="1">
+              <a:schemeClr val="accent1"/>
+            </a:fillRef>
+            <a:effectRef idx="0">
+              <a:schemeClr val="accent1"/>
+            </a:effectRef>
+            <a:fontRef idx="minor">
+              <a:schemeClr val="lt1"/>
+            </a:fontRef>
+          </p:style>
+          <p:txBody>
+            <a:bodyPr rtlCol="0" anchor="ctr"/>
+            <a:lstStyle/>
+            <a:p>
+              <a:pPr algn="ctr"/>
+              <a:endParaRPr lang="es-CO"/>
+            </a:p>
+          </p:txBody>
+        </p:sp>
+        <p:sp>
+          <p:nvSpPr>
+            <p:cNvPr id="35" name="Elipse 34">
+              <a:extLst>
+                <a:ext uri="{FF2B5EF4-FFF2-40B4-BE49-F238E27FC236}">
+                  <a16:creationId xmlns:a16="http://schemas.microsoft.com/office/drawing/2014/main" id="{A6146339-9686-4B38-8F6D-030A9D7BB004}"/>
+                </a:ext>
+              </a:extLst>
+            </p:cNvPr>
+            <p:cNvSpPr/>
+            <p:nvPr/>
+          </p:nvSpPr>
+          <p:spPr>
+            <a:xfrm>
+              <a:off x="8104425" y="2471530"/>
+              <a:ext cx="490331" cy="463826"/>
+            </a:xfrm>
+            <a:prstGeom prst="ellipse">
+              <a:avLst/>
+            </a:prstGeom>
+            <a:noFill/>
+          </p:spPr>
+          <p:style>
+            <a:lnRef idx="2">
+              <a:schemeClr val="accent1">
+                <a:shade val="50000"/>
+              </a:schemeClr>
+            </a:lnRef>
+            <a:fillRef idx="1">
+              <a:schemeClr val="accent1"/>
+            </a:fillRef>
+            <a:effectRef idx="0">
+              <a:schemeClr val="accent1"/>
+            </a:effectRef>
+            <a:fontRef idx="minor">
+              <a:schemeClr val="lt1"/>
+            </a:fontRef>
+          </p:style>
+          <p:txBody>
+            <a:bodyPr rtlCol="0" anchor="ctr"/>
+            <a:lstStyle/>
+            <a:p>
+              <a:pPr algn="ctr"/>
+              <a:endParaRPr lang="es-CO"/>
+            </a:p>
+          </p:txBody>
+        </p:sp>
+        <p:sp>
+          <p:nvSpPr>
+            <p:cNvPr id="36" name="Elipse 35">
+              <a:extLst>
+                <a:ext uri="{FF2B5EF4-FFF2-40B4-BE49-F238E27FC236}">
+                  <a16:creationId xmlns:a16="http://schemas.microsoft.com/office/drawing/2014/main" id="{CB63D7C7-CF74-44B2-8760-3CF3BC210B7A}"/>
+                </a:ext>
+              </a:extLst>
+            </p:cNvPr>
+            <p:cNvSpPr/>
+            <p:nvPr/>
+          </p:nvSpPr>
+          <p:spPr>
+            <a:xfrm>
+              <a:off x="11225314" y="2372141"/>
+              <a:ext cx="490330" cy="463826"/>
+            </a:xfrm>
+            <a:prstGeom prst="ellipse">
+              <a:avLst/>
+            </a:prstGeom>
+            <a:noFill/>
+          </p:spPr>
+          <p:style>
+            <a:lnRef idx="2">
+              <a:schemeClr val="accent1">
+                <a:shade val="50000"/>
+              </a:schemeClr>
+            </a:lnRef>
+            <a:fillRef idx="1">
+              <a:schemeClr val="accent1"/>
+            </a:fillRef>
+            <a:effectRef idx="0">
+              <a:schemeClr val="accent1"/>
+            </a:effectRef>
+            <a:fontRef idx="minor">
+              <a:schemeClr val="lt1"/>
+            </a:fontRef>
+          </p:style>
+          <p:txBody>
+            <a:bodyPr rtlCol="0" anchor="ctr"/>
+            <a:lstStyle/>
+            <a:p>
+              <a:pPr algn="ctr"/>
+              <a:endParaRPr lang="es-CO"/>
+            </a:p>
+          </p:txBody>
+        </p:sp>
+      </p:grpSp>
+      <p:sp>
+        <p:nvSpPr>
+          <p:cNvPr id="11" name="CuadroTexto 10">
+            <a:extLst>
+              <a:ext uri="{FF2B5EF4-FFF2-40B4-BE49-F238E27FC236}">
+                <a16:creationId xmlns:a16="http://schemas.microsoft.com/office/drawing/2014/main" id="{361480D1-177E-4502-9236-29EDAE96AC77}"/>
+              </a:ext>
+            </a:extLst>
+          </p:cNvPr>
+          <p:cNvSpPr txBox="1"/>
+          <p:nvPr/>
+        </p:nvSpPr>
+        <p:spPr>
+          <a:xfrm>
+            <a:off x="9283441" y="1374451"/>
+            <a:ext cx="256906" cy="646331"/>
+          </a:xfrm>
+          <a:prstGeom prst="rect">
+            <a:avLst/>
+          </a:prstGeom>
+          <a:noFill/>
+        </p:spPr>
+        <p:txBody>
+          <a:bodyPr wrap="square" rtlCol="0">
+            <a:spAutoFit/>
+          </a:bodyPr>
+          <a:lstStyle/>
+          <a:p>
+            <a:r>
+              <a:rPr lang="es-CO" dirty="0"/>
+              <a:t>u</a:t>
+            </a:r>
+          </a:p>
+          <a:p>
+            <a:endParaRPr lang="es-CO" dirty="0"/>
+          </a:p>
+        </p:txBody>
+      </p:sp>
+      <p:sp>
+        <p:nvSpPr>
+          <p:cNvPr id="12" name="CuadroTexto 11">
+            <a:extLst>
+              <a:ext uri="{FF2B5EF4-FFF2-40B4-BE49-F238E27FC236}">
+                <a16:creationId xmlns:a16="http://schemas.microsoft.com/office/drawing/2014/main" id="{912A6F60-EA73-4EF7-A87E-737B0303EC3A}"/>
+              </a:ext>
+            </a:extLst>
+          </p:cNvPr>
+          <p:cNvSpPr txBox="1"/>
+          <p:nvPr/>
+        </p:nvSpPr>
+        <p:spPr>
+          <a:xfrm>
+            <a:off x="9261637" y="5184434"/>
+            <a:ext cx="256906" cy="369332"/>
+          </a:xfrm>
+          <a:prstGeom prst="rect">
+            <a:avLst/>
+          </a:prstGeom>
+          <a:noFill/>
+        </p:spPr>
+        <p:txBody>
+          <a:bodyPr wrap="square" rtlCol="0">
+            <a:spAutoFit/>
+          </a:bodyPr>
+          <a:lstStyle/>
+          <a:p>
+            <a:r>
+              <a:rPr lang="es-CO" dirty="0"/>
+              <a:t>v</a:t>
+            </a:r>
+          </a:p>
+        </p:txBody>
+      </p:sp>
+      <p:sp>
+        <p:nvSpPr>
+          <p:cNvPr id="13" name="CuadroTexto 12">
+            <a:extLst>
+              <a:ext uri="{FF2B5EF4-FFF2-40B4-BE49-F238E27FC236}">
+                <a16:creationId xmlns:a16="http://schemas.microsoft.com/office/drawing/2014/main" id="{1DCFED14-09B5-4442-AA04-85E14276EFC6}"/>
+              </a:ext>
+            </a:extLst>
+          </p:cNvPr>
+          <p:cNvSpPr txBox="1"/>
+          <p:nvPr/>
+        </p:nvSpPr>
+        <p:spPr>
+          <a:xfrm>
+            <a:off x="7749121" y="1557130"/>
+            <a:ext cx="1134145" cy="369332"/>
+          </a:xfrm>
+          <a:prstGeom prst="rect">
+            <a:avLst/>
+          </a:prstGeom>
+          <a:noFill/>
+        </p:spPr>
+        <p:txBody>
+          <a:bodyPr wrap="square" rtlCol="0">
+            <a:spAutoFit/>
+          </a:bodyPr>
+          <a:lstStyle/>
+          <a:p>
+            <a:r>
+              <a:rPr lang="es-CO" dirty="0"/>
+              <a:t>trancón</a:t>
+            </a:r>
+          </a:p>
+        </p:txBody>
+      </p:sp>
+      <p:sp>
+        <p:nvSpPr>
+          <p:cNvPr id="14" name="CuadroTexto 13">
+            <a:extLst>
+              <a:ext uri="{FF2B5EF4-FFF2-40B4-BE49-F238E27FC236}">
+                <a16:creationId xmlns:a16="http://schemas.microsoft.com/office/drawing/2014/main" id="{23ED0A28-DBDC-41CE-8858-31C202A16AE4}"/>
+              </a:ext>
+            </a:extLst>
+          </p:cNvPr>
+          <p:cNvSpPr txBox="1"/>
+          <p:nvPr/>
+        </p:nvSpPr>
+        <p:spPr>
+          <a:xfrm>
+            <a:off x="7450160" y="4891608"/>
+            <a:ext cx="1493030" cy="369332"/>
+          </a:xfrm>
+          <a:prstGeom prst="rect">
+            <a:avLst/>
+          </a:prstGeom>
+          <a:noFill/>
+        </p:spPr>
+        <p:txBody>
+          <a:bodyPr wrap="square" rtlCol="0">
+            <a:spAutoFit/>
+          </a:bodyPr>
+          <a:lstStyle/>
+          <a:p>
+            <a:r>
+              <a:rPr lang="es-CO" dirty="0"/>
+              <a:t>Sin trancón</a:t>
+            </a:r>
+          </a:p>
+        </p:txBody>
+      </p:sp>
+      <p:sp>
+        <p:nvSpPr>
+          <p:cNvPr id="15" name="CuadroTexto 14">
+            <a:extLst>
+              <a:ext uri="{FF2B5EF4-FFF2-40B4-BE49-F238E27FC236}">
+                <a16:creationId xmlns:a16="http://schemas.microsoft.com/office/drawing/2014/main" id="{E2F7C707-CBE8-4111-B980-18D89EB38367}"/>
+              </a:ext>
+            </a:extLst>
+          </p:cNvPr>
+          <p:cNvSpPr txBox="1"/>
+          <p:nvPr/>
+        </p:nvSpPr>
+        <p:spPr>
+          <a:xfrm>
+            <a:off x="10140244" y="4802155"/>
+            <a:ext cx="1134145" cy="369332"/>
+          </a:xfrm>
+          <a:prstGeom prst="rect">
+            <a:avLst/>
+          </a:prstGeom>
+          <a:noFill/>
+        </p:spPr>
+        <p:txBody>
+          <a:bodyPr wrap="square" rtlCol="0">
+            <a:spAutoFit/>
+          </a:bodyPr>
+          <a:lstStyle/>
+          <a:p>
+            <a:r>
+              <a:rPr lang="es-CO" dirty="0"/>
+              <a:t>trancón</a:t>
+            </a:r>
+          </a:p>
+        </p:txBody>
+      </p:sp>
+      <p:cxnSp>
+        <p:nvCxnSpPr>
+          <p:cNvPr id="49" name="Conector recto 48">
+            <a:extLst>
+              <a:ext uri="{FF2B5EF4-FFF2-40B4-BE49-F238E27FC236}">
+                <a16:creationId xmlns:a16="http://schemas.microsoft.com/office/drawing/2014/main" id="{40C1E4DB-4589-4493-A445-4B586A5AC7BE}"/>
+              </a:ext>
+            </a:extLst>
+          </p:cNvPr>
+          <p:cNvCxnSpPr>
+            <a:cxnSpLocks/>
+          </p:cNvCxnSpPr>
+          <p:nvPr/>
+        </p:nvCxnSpPr>
+        <p:spPr>
+          <a:xfrm>
+            <a:off x="7786759" y="2935356"/>
+            <a:ext cx="0" cy="1186067"/>
+          </a:xfrm>
+          <a:prstGeom prst="line">
+            <a:avLst/>
+          </a:prstGeom>
+        </p:spPr>
+        <p:style>
+          <a:lnRef idx="1">
+            <a:schemeClr val="accent1"/>
+          </a:lnRef>
+          <a:fillRef idx="0">
+            <a:schemeClr val="accent1"/>
+          </a:fillRef>
+          <a:effectRef idx="0">
+            <a:schemeClr val="accent1"/>
+          </a:effectRef>
+          <a:fontRef idx="minor">
+            <a:schemeClr val="tx1"/>
+          </a:fontRef>
+        </p:style>
+      </p:cxnSp>
+      <p:sp>
+        <p:nvSpPr>
+          <p:cNvPr id="55" name="CuadroTexto 54">
+            <a:extLst>
+              <a:ext uri="{FF2B5EF4-FFF2-40B4-BE49-F238E27FC236}">
+                <a16:creationId xmlns:a16="http://schemas.microsoft.com/office/drawing/2014/main" id="{82FC2249-5008-431A-8D8F-71A49DF17381}"/>
+              </a:ext>
+            </a:extLst>
+          </p:cNvPr>
+          <p:cNvSpPr txBox="1"/>
+          <p:nvPr/>
+        </p:nvSpPr>
+        <p:spPr>
+          <a:xfrm>
+            <a:off x="6798365" y="3309641"/>
+            <a:ext cx="1134145" cy="369332"/>
+          </a:xfrm>
+          <a:prstGeom prst="rect">
+            <a:avLst/>
+          </a:prstGeom>
+          <a:noFill/>
+        </p:spPr>
+        <p:txBody>
+          <a:bodyPr wrap="square" rtlCol="0">
+            <a:spAutoFit/>
+          </a:bodyPr>
+          <a:lstStyle/>
+          <a:p>
+            <a:r>
+              <a:rPr lang="es-CO" dirty="0"/>
+              <a:t>trancón</a:t>
+            </a:r>
+          </a:p>
+        </p:txBody>
+      </p:sp>
+      <p:sp>
+        <p:nvSpPr>
+          <p:cNvPr id="56" name="CuadroTexto 55">
+            <a:extLst>
+              <a:ext uri="{FF2B5EF4-FFF2-40B4-BE49-F238E27FC236}">
+                <a16:creationId xmlns:a16="http://schemas.microsoft.com/office/drawing/2014/main" id="{EFB8605F-A87C-4363-A9A5-304EF963A079}"/>
+              </a:ext>
+            </a:extLst>
+          </p:cNvPr>
+          <p:cNvSpPr txBox="1"/>
+          <p:nvPr/>
+        </p:nvSpPr>
+        <p:spPr>
+          <a:xfrm>
+            <a:off x="9909493" y="1568189"/>
+            <a:ext cx="1493030" cy="369332"/>
+          </a:xfrm>
+          <a:prstGeom prst="rect">
+            <a:avLst/>
+          </a:prstGeom>
+          <a:noFill/>
+        </p:spPr>
+        <p:txBody>
+          <a:bodyPr wrap="square" rtlCol="0">
+            <a:spAutoFit/>
+          </a:bodyPr>
+          <a:lstStyle/>
+          <a:p>
+            <a:r>
+              <a:rPr lang="es-CO" dirty="0"/>
+              <a:t>Sin trancón</a:t>
+            </a:r>
+          </a:p>
+        </p:txBody>
+      </p:sp>
+      <p:sp>
+        <p:nvSpPr>
+          <p:cNvPr id="57" name="CuadroTexto 56">
+            <a:extLst>
+              <a:ext uri="{FF2B5EF4-FFF2-40B4-BE49-F238E27FC236}">
+                <a16:creationId xmlns:a16="http://schemas.microsoft.com/office/drawing/2014/main" id="{80A423E0-A1F8-4C8A-B6CF-6A2D79950D29}"/>
+              </a:ext>
+            </a:extLst>
+          </p:cNvPr>
+          <p:cNvSpPr txBox="1"/>
+          <p:nvPr/>
+        </p:nvSpPr>
+        <p:spPr>
+          <a:xfrm>
+            <a:off x="10861289" y="3194251"/>
+            <a:ext cx="1493030" cy="369332"/>
+          </a:xfrm>
+          <a:prstGeom prst="rect">
+            <a:avLst/>
+          </a:prstGeom>
+          <a:noFill/>
+        </p:spPr>
+        <p:txBody>
+          <a:bodyPr wrap="square" rtlCol="0">
+            <a:spAutoFit/>
+          </a:bodyPr>
+          <a:lstStyle/>
+          <a:p>
+            <a:r>
+              <a:rPr lang="es-CO" dirty="0"/>
+              <a:t>Sin trancón</a:t>
+            </a:r>
+          </a:p>
+        </p:txBody>
+      </p:sp>
+      <p:sp>
+        <p:nvSpPr>
+          <p:cNvPr id="69" name="CuadroTexto 68">
+            <a:extLst>
+              <a:ext uri="{FF2B5EF4-FFF2-40B4-BE49-F238E27FC236}">
+                <a16:creationId xmlns:a16="http://schemas.microsoft.com/office/drawing/2014/main" id="{8C676580-4C5F-4BE6-B4FF-A5BAC4EEA676}"/>
+              </a:ext>
+            </a:extLst>
+          </p:cNvPr>
+          <p:cNvSpPr txBox="1"/>
+          <p:nvPr/>
+        </p:nvSpPr>
+        <p:spPr>
+          <a:xfrm>
+            <a:off x="2178003" y="2020782"/>
+            <a:ext cx="4399358" cy="2862322"/>
+          </a:xfrm>
+          <a:prstGeom prst="rect">
+            <a:avLst/>
+          </a:prstGeom>
+          <a:noFill/>
+        </p:spPr>
+        <p:txBody>
+          <a:bodyPr wrap="square" rtlCol="0">
+            <a:spAutoFit/>
+          </a:bodyPr>
+          <a:lstStyle/>
+          <a:p>
+            <a:r>
+              <a:rPr lang="es-CO" sz="2000" dirty="0"/>
+              <a:t>Ahora considere este otro ejemplo. Dado este grafo, suponga ahora que la persona tolera máximo 1 trancón. Observe que para moverse del punto u al v, el camino rojo no podría ser una opción, ya que estaría atravesando dos trancones, y la persona no podría tolerarlo.</a:t>
+            </a:r>
+            <a:endParaRPr lang="es-CO" sz="2000" b="1" dirty="0"/>
+          </a:p>
+        </p:txBody>
+      </p:sp>
+      <p:cxnSp>
+        <p:nvCxnSpPr>
+          <p:cNvPr id="25" name="Conector recto 24">
+            <a:extLst>
+              <a:ext uri="{FF2B5EF4-FFF2-40B4-BE49-F238E27FC236}">
+                <a16:creationId xmlns:a16="http://schemas.microsoft.com/office/drawing/2014/main" id="{8BFBEAF6-0173-43E4-A57A-952E5113C8E1}"/>
+              </a:ext>
+            </a:extLst>
+          </p:cNvPr>
+          <p:cNvCxnSpPr>
+            <a:cxnSpLocks/>
+            <a:stCxn id="11" idx="1"/>
+          </p:cNvCxnSpPr>
+          <p:nvPr/>
+        </p:nvCxnSpPr>
+        <p:spPr>
+          <a:xfrm flipH="1">
+            <a:off x="7836394" y="1697617"/>
+            <a:ext cx="1447047" cy="773913"/>
+          </a:xfrm>
+          <a:prstGeom prst="line">
+            <a:avLst/>
+          </a:prstGeom>
+          <a:ln w="38100">
+            <a:solidFill>
+              <a:srgbClr val="FF0000"/>
+            </a:solidFill>
+          </a:ln>
+        </p:spPr>
+        <p:style>
+          <a:lnRef idx="1">
+            <a:schemeClr val="accent1"/>
+          </a:lnRef>
+          <a:fillRef idx="0">
+            <a:schemeClr val="accent1"/>
+          </a:fillRef>
+          <a:effectRef idx="0">
+            <a:schemeClr val="accent1"/>
+          </a:effectRef>
+          <a:fontRef idx="minor">
+            <a:schemeClr val="tx1"/>
+          </a:fontRef>
+        </p:style>
+      </p:cxnSp>
+      <p:cxnSp>
+        <p:nvCxnSpPr>
+          <p:cNvPr id="28" name="Conector recto 27">
+            <a:extLst>
+              <a:ext uri="{FF2B5EF4-FFF2-40B4-BE49-F238E27FC236}">
+                <a16:creationId xmlns:a16="http://schemas.microsoft.com/office/drawing/2014/main" id="{6B071E88-9A15-4580-9E16-4114603C5ED0}"/>
+              </a:ext>
+            </a:extLst>
+          </p:cNvPr>
+          <p:cNvCxnSpPr>
+            <a:cxnSpLocks/>
+          </p:cNvCxnSpPr>
+          <p:nvPr/>
+        </p:nvCxnSpPr>
+        <p:spPr>
+          <a:xfrm>
+            <a:off x="9570254" y="1721117"/>
+            <a:ext cx="1164035" cy="718950"/>
+          </a:xfrm>
+          <a:prstGeom prst="line">
+            <a:avLst/>
+          </a:prstGeom>
+        </p:spPr>
+        <p:style>
+          <a:lnRef idx="1">
+            <a:schemeClr val="accent1"/>
+          </a:lnRef>
+          <a:fillRef idx="0">
+            <a:schemeClr val="accent1"/>
+          </a:fillRef>
+          <a:effectRef idx="0">
+            <a:schemeClr val="accent1"/>
+          </a:effectRef>
+          <a:fontRef idx="minor">
+            <a:schemeClr val="tx1"/>
+          </a:fontRef>
+        </p:style>
+      </p:cxnSp>
+      <p:cxnSp>
+        <p:nvCxnSpPr>
+          <p:cNvPr id="33" name="Conector recto 32">
+            <a:extLst>
+              <a:ext uri="{FF2B5EF4-FFF2-40B4-BE49-F238E27FC236}">
+                <a16:creationId xmlns:a16="http://schemas.microsoft.com/office/drawing/2014/main" id="{511422C5-95BD-4424-8CB3-B5E506E0CF3E}"/>
+              </a:ext>
+            </a:extLst>
+          </p:cNvPr>
+          <p:cNvCxnSpPr>
+            <a:cxnSpLocks/>
+          </p:cNvCxnSpPr>
+          <p:nvPr/>
+        </p:nvCxnSpPr>
+        <p:spPr>
+          <a:xfrm flipH="1">
+            <a:off x="7786757" y="2947689"/>
+            <a:ext cx="1" cy="1186067"/>
+          </a:xfrm>
+          <a:prstGeom prst="line">
+            <a:avLst/>
+          </a:prstGeom>
+          <a:ln w="38100">
+            <a:solidFill>
+              <a:srgbClr val="FF0000"/>
+            </a:solidFill>
+          </a:ln>
+        </p:spPr>
+        <p:style>
+          <a:lnRef idx="1">
+            <a:schemeClr val="accent1"/>
+          </a:lnRef>
+          <a:fillRef idx="0">
+            <a:schemeClr val="accent1"/>
+          </a:fillRef>
+          <a:effectRef idx="0">
+            <a:schemeClr val="accent1"/>
+          </a:effectRef>
+          <a:fontRef idx="minor">
+            <a:schemeClr val="tx1"/>
+          </a:fontRef>
+        </p:style>
+      </p:cxnSp>
+      <p:cxnSp>
+        <p:nvCxnSpPr>
+          <p:cNvPr id="37" name="Conector recto 36">
+            <a:extLst>
+              <a:ext uri="{FF2B5EF4-FFF2-40B4-BE49-F238E27FC236}">
+                <a16:creationId xmlns:a16="http://schemas.microsoft.com/office/drawing/2014/main" id="{E9215504-953D-469D-9817-A5E1713A5935}"/>
+              </a:ext>
+            </a:extLst>
+          </p:cNvPr>
+          <p:cNvCxnSpPr>
+            <a:cxnSpLocks/>
+          </p:cNvCxnSpPr>
+          <p:nvPr/>
+        </p:nvCxnSpPr>
+        <p:spPr>
+          <a:xfrm flipH="1">
+            <a:off x="10920347" y="2835967"/>
+            <a:ext cx="1" cy="1186067"/>
+          </a:xfrm>
+          <a:prstGeom prst="line">
+            <a:avLst/>
+          </a:prstGeom>
+        </p:spPr>
+        <p:style>
+          <a:lnRef idx="1">
+            <a:schemeClr val="accent1"/>
+          </a:lnRef>
+          <a:fillRef idx="0">
+            <a:schemeClr val="accent1"/>
+          </a:fillRef>
+          <a:effectRef idx="0">
+            <a:schemeClr val="accent1"/>
+          </a:effectRef>
+          <a:fontRef idx="minor">
+            <a:schemeClr val="tx1"/>
+          </a:fontRef>
+        </p:style>
+      </p:cxnSp>
+      <p:cxnSp>
+        <p:nvCxnSpPr>
+          <p:cNvPr id="38" name="Conector recto 37">
+            <a:extLst>
+              <a:ext uri="{FF2B5EF4-FFF2-40B4-BE49-F238E27FC236}">
+                <a16:creationId xmlns:a16="http://schemas.microsoft.com/office/drawing/2014/main" id="{63D08325-B41B-455C-9D8F-E61EF781AA1F}"/>
+              </a:ext>
+            </a:extLst>
+          </p:cNvPr>
+          <p:cNvCxnSpPr>
+            <a:cxnSpLocks/>
+          </p:cNvCxnSpPr>
+          <p:nvPr/>
+        </p:nvCxnSpPr>
+        <p:spPr>
+          <a:xfrm flipV="1">
+            <a:off x="9551101" y="4417934"/>
+            <a:ext cx="1183188" cy="818339"/>
+          </a:xfrm>
+          <a:prstGeom prst="line">
+            <a:avLst/>
+          </a:prstGeom>
+        </p:spPr>
+        <p:style>
+          <a:lnRef idx="1">
+            <a:schemeClr val="accent1"/>
+          </a:lnRef>
+          <a:fillRef idx="0">
+            <a:schemeClr val="accent1"/>
+          </a:fillRef>
+          <a:effectRef idx="0">
+            <a:schemeClr val="accent1"/>
+          </a:effectRef>
+          <a:fontRef idx="minor">
+            <a:schemeClr val="tx1"/>
+          </a:fontRef>
+        </p:style>
+      </p:cxnSp>
+      <p:cxnSp>
+        <p:nvCxnSpPr>
+          <p:cNvPr id="39" name="Conector recto 38">
+            <a:extLst>
+              <a:ext uri="{FF2B5EF4-FFF2-40B4-BE49-F238E27FC236}">
+                <a16:creationId xmlns:a16="http://schemas.microsoft.com/office/drawing/2014/main" id="{1FE4DA40-0CF0-443A-AE0E-C31D2AFE17D7}"/>
+              </a:ext>
+            </a:extLst>
+          </p:cNvPr>
+          <p:cNvCxnSpPr>
+            <a:cxnSpLocks/>
+          </p:cNvCxnSpPr>
+          <p:nvPr/>
+        </p:nvCxnSpPr>
+        <p:spPr>
+          <a:xfrm>
+            <a:off x="7960117" y="4517323"/>
+            <a:ext cx="1244267" cy="718950"/>
+          </a:xfrm>
+          <a:prstGeom prst="line">
+            <a:avLst/>
+          </a:prstGeom>
+          <a:ln w="38100">
+            <a:solidFill>
+              <a:srgbClr val="FF0000"/>
+            </a:solidFill>
+          </a:ln>
+        </p:spPr>
+        <p:style>
+          <a:lnRef idx="1">
+            <a:schemeClr val="accent1"/>
+          </a:lnRef>
+          <a:fillRef idx="0">
+            <a:schemeClr val="accent1"/>
+          </a:fillRef>
+          <a:effectRef idx="0">
+            <a:schemeClr val="accent1"/>
+          </a:effectRef>
+          <a:fontRef idx="minor">
+            <a:schemeClr val="tx1"/>
+          </a:fontRef>
+        </p:style>
+      </p:cxnSp>
+      <p:cxnSp>
+        <p:nvCxnSpPr>
+          <p:cNvPr id="42" name="Conector recto 41">
+            <a:extLst>
+              <a:ext uri="{FF2B5EF4-FFF2-40B4-BE49-F238E27FC236}">
+                <a16:creationId xmlns:a16="http://schemas.microsoft.com/office/drawing/2014/main" id="{2FBF5331-323B-4320-9187-F68EC64CF449}"/>
+              </a:ext>
+            </a:extLst>
+          </p:cNvPr>
+          <p:cNvCxnSpPr>
+            <a:cxnSpLocks/>
+            <a:endCxn id="23" idx="0"/>
+          </p:cNvCxnSpPr>
+          <p:nvPr/>
+        </p:nvCxnSpPr>
+        <p:spPr>
+          <a:xfrm>
+            <a:off x="9423132" y="1838277"/>
+            <a:ext cx="974" cy="1358810"/>
+          </a:xfrm>
+          <a:prstGeom prst="line">
+            <a:avLst/>
+          </a:prstGeom>
+        </p:spPr>
+        <p:style>
+          <a:lnRef idx="1">
+            <a:schemeClr val="accent1"/>
+          </a:lnRef>
+          <a:fillRef idx="0">
+            <a:schemeClr val="accent1"/>
+          </a:fillRef>
+          <a:effectRef idx="0">
+            <a:schemeClr val="accent1"/>
+          </a:effectRef>
+          <a:fontRef idx="minor">
+            <a:schemeClr val="tx1"/>
+          </a:fontRef>
+        </p:style>
+      </p:cxnSp>
+      <p:sp>
+        <p:nvSpPr>
+          <p:cNvPr id="23" name="Diagrama de flujo: conector 22">
+            <a:extLst>
+              <a:ext uri="{FF2B5EF4-FFF2-40B4-BE49-F238E27FC236}">
+                <a16:creationId xmlns:a16="http://schemas.microsoft.com/office/drawing/2014/main" id="{5C83467A-F102-4090-A43C-9308C3847C60}"/>
+              </a:ext>
+            </a:extLst>
+          </p:cNvPr>
+          <p:cNvSpPr/>
+          <p:nvPr/>
+        </p:nvSpPr>
+        <p:spPr>
+          <a:xfrm>
+            <a:off x="9178941" y="3197087"/>
+            <a:ext cx="490329" cy="463826"/>
+          </a:xfrm>
+          <a:prstGeom prst="flowChartConnector">
+            <a:avLst/>
+          </a:prstGeom>
+          <a:noFill/>
+        </p:spPr>
+        <p:style>
+          <a:lnRef idx="2">
+            <a:schemeClr val="accent1">
+              <a:shade val="50000"/>
+            </a:schemeClr>
+          </a:lnRef>
+          <a:fillRef idx="1">
+            <a:schemeClr val="accent1"/>
+          </a:fillRef>
+          <a:effectRef idx="0">
+            <a:schemeClr val="accent1"/>
+          </a:effectRef>
+          <a:fontRef idx="minor">
+            <a:schemeClr val="lt1"/>
+          </a:fontRef>
+        </p:style>
+        <p:txBody>
+          <a:bodyPr rtlCol="0" anchor="ctr"/>
+          <a:lstStyle/>
+          <a:p>
+            <a:pPr algn="ctr"/>
+            <a:endParaRPr lang="es-CO"/>
+          </a:p>
+        </p:txBody>
+      </p:sp>
+      <p:cxnSp>
+        <p:nvCxnSpPr>
+          <p:cNvPr id="58" name="Conector recto 57">
+            <a:extLst>
+              <a:ext uri="{FF2B5EF4-FFF2-40B4-BE49-F238E27FC236}">
+                <a16:creationId xmlns:a16="http://schemas.microsoft.com/office/drawing/2014/main" id="{1EF31926-71D1-49AF-A37A-23D92F9FF205}"/>
+              </a:ext>
+            </a:extLst>
+          </p:cNvPr>
+          <p:cNvCxnSpPr>
+            <a:cxnSpLocks/>
+            <a:stCxn id="23" idx="4"/>
+            <a:endCxn id="12" idx="0"/>
+          </p:cNvCxnSpPr>
+          <p:nvPr/>
+        </p:nvCxnSpPr>
+        <p:spPr>
+          <a:xfrm flipH="1">
+            <a:off x="9390090" y="3660913"/>
+            <a:ext cx="34016" cy="1523521"/>
+          </a:xfrm>
+          <a:prstGeom prst="line">
+            <a:avLst/>
+          </a:prstGeom>
+        </p:spPr>
+        <p:style>
+          <a:lnRef idx="1">
+            <a:schemeClr val="accent1"/>
+          </a:lnRef>
+          <a:fillRef idx="0">
+            <a:schemeClr val="accent1"/>
+          </a:fillRef>
+          <a:effectRef idx="0">
+            <a:schemeClr val="accent1"/>
+          </a:effectRef>
+          <a:fontRef idx="minor">
+            <a:schemeClr val="tx1"/>
+          </a:fontRef>
+        </p:style>
+      </p:cxnSp>
+      <p:sp>
+        <p:nvSpPr>
+          <p:cNvPr id="66" name="CuadroTexto 65">
+            <a:extLst>
+              <a:ext uri="{FF2B5EF4-FFF2-40B4-BE49-F238E27FC236}">
+                <a16:creationId xmlns:a16="http://schemas.microsoft.com/office/drawing/2014/main" id="{CC9B6CEE-8277-47BF-A825-F6D752DB9FFC}"/>
+              </a:ext>
+            </a:extLst>
+          </p:cNvPr>
+          <p:cNvSpPr txBox="1"/>
+          <p:nvPr/>
+        </p:nvSpPr>
+        <p:spPr>
+          <a:xfrm>
+            <a:off x="8188765" y="2663124"/>
+            <a:ext cx="1447046" cy="338554"/>
+          </a:xfrm>
+          <a:prstGeom prst="rect">
+            <a:avLst/>
+          </a:prstGeom>
+          <a:noFill/>
+        </p:spPr>
+        <p:txBody>
+          <a:bodyPr wrap="square" rtlCol="0">
+            <a:spAutoFit/>
+          </a:bodyPr>
+          <a:lstStyle/>
+          <a:p>
+            <a:r>
+              <a:rPr lang="es-CO" sz="1600" dirty="0"/>
+              <a:t>Sin trancón</a:t>
+            </a:r>
+          </a:p>
+        </p:txBody>
+      </p:sp>
+      <p:sp>
+        <p:nvSpPr>
+          <p:cNvPr id="67" name="CuadroTexto 66">
+            <a:extLst>
+              <a:ext uri="{FF2B5EF4-FFF2-40B4-BE49-F238E27FC236}">
+                <a16:creationId xmlns:a16="http://schemas.microsoft.com/office/drawing/2014/main" id="{DAF59D5D-5CBF-4D45-A4A5-11B9474843A9}"/>
+              </a:ext>
+            </a:extLst>
+          </p:cNvPr>
+          <p:cNvSpPr txBox="1"/>
+          <p:nvPr/>
+        </p:nvSpPr>
+        <p:spPr>
+          <a:xfrm>
+            <a:off x="8409288" y="4063731"/>
+            <a:ext cx="1134145" cy="369332"/>
+          </a:xfrm>
+          <a:prstGeom prst="rect">
+            <a:avLst/>
+          </a:prstGeom>
+          <a:noFill/>
+        </p:spPr>
+        <p:txBody>
+          <a:bodyPr wrap="square" rtlCol="0">
+            <a:spAutoFit/>
+          </a:bodyPr>
+          <a:lstStyle/>
+          <a:p>
+            <a:r>
+              <a:rPr lang="es-CO" dirty="0"/>
+              <a:t>trancón</a:t>
+            </a:r>
+          </a:p>
+        </p:txBody>
+      </p:sp>
+    </p:spTree>
+    <p:extLst>
+      <p:ext uri="{BB962C8B-B14F-4D97-AF65-F5344CB8AC3E}">
+        <p14:creationId xmlns:p14="http://schemas.microsoft.com/office/powerpoint/2010/main" val="3312606887"/>
+      </p:ext>
+    </p:extLst>
+  </p:cSld>
+  <p:clrMapOvr>
+    <a:masterClrMapping/>
+  </p:clrMapOvr>
+</p:sld>
+</file>
+
+<file path=ppt/slides/slide5.xml><?xml version="1.0" encoding="utf-8"?>
+<p:sld xmlns:a="http://schemas.openxmlformats.org/drawingml/2006/main" xmlns:r="http://schemas.openxmlformats.org/officeDocument/2006/relationships" xmlns:p="http://schemas.openxmlformats.org/presentationml/2006/main">
+  <p:cSld>
+    <p:spTree>
+      <p:nvGrpSpPr>
+        <p:cNvPr id="1" name=""/>
+        <p:cNvGrpSpPr/>
+        <p:nvPr/>
+      </p:nvGrpSpPr>
+      <p:grpSpPr>
+        <a:xfrm>
+          <a:off x="0" y="0"/>
+          <a:ext cx="0" cy="0"/>
+          <a:chOff x="0" y="0"/>
+          <a:chExt cx="0" cy="0"/>
+        </a:xfrm>
+      </p:grpSpPr>
+      <p:grpSp>
+        <p:nvGrpSpPr>
+          <p:cNvPr id="5" name="Grupo 4">
+            <a:extLst>
+              <a:ext uri="{FF2B5EF4-FFF2-40B4-BE49-F238E27FC236}">
+                <a16:creationId xmlns:a16="http://schemas.microsoft.com/office/drawing/2014/main" id="{394DDF05-E454-4F11-AB50-E1A41C3C8F68}"/>
+              </a:ext>
+            </a:extLst>
+          </p:cNvPr>
+          <p:cNvGrpSpPr/>
+          <p:nvPr/>
+        </p:nvGrpSpPr>
+        <p:grpSpPr>
+          <a:xfrm>
+            <a:off x="7579693" y="1325217"/>
+            <a:ext cx="3611220" cy="1610139"/>
+            <a:chOff x="8024193" y="1325217"/>
+            <a:chExt cx="3611220" cy="1610139"/>
+          </a:xfrm>
+        </p:grpSpPr>
+        <p:sp>
+          <p:nvSpPr>
+            <p:cNvPr id="43" name="Elipse 42">
+              <a:extLst>
+                <a:ext uri="{FF2B5EF4-FFF2-40B4-BE49-F238E27FC236}">
+                  <a16:creationId xmlns:a16="http://schemas.microsoft.com/office/drawing/2014/main" id="{AC0B517B-CEEF-4B41-8361-D865B28FFE9D}"/>
+                </a:ext>
+              </a:extLst>
+            </p:cNvPr>
+            <p:cNvSpPr/>
+            <p:nvPr/>
+          </p:nvSpPr>
+          <p:spPr>
+            <a:xfrm>
+              <a:off x="9634330" y="1325217"/>
+              <a:ext cx="490331" cy="463826"/>
+            </a:xfrm>
+            <a:prstGeom prst="ellipse">
+              <a:avLst/>
+            </a:prstGeom>
+            <a:noFill/>
+          </p:spPr>
+          <p:style>
+            <a:lnRef idx="2">
+              <a:schemeClr val="accent1">
+                <a:shade val="50000"/>
+              </a:schemeClr>
+            </a:lnRef>
+            <a:fillRef idx="1">
+              <a:schemeClr val="accent1"/>
+            </a:fillRef>
+            <a:effectRef idx="0">
+              <a:schemeClr val="accent1"/>
+            </a:effectRef>
+            <a:fontRef idx="minor">
+              <a:schemeClr val="lt1"/>
+            </a:fontRef>
+          </p:style>
+          <p:txBody>
+            <a:bodyPr rtlCol="0" anchor="ctr"/>
+            <a:lstStyle/>
+            <a:p>
+              <a:pPr algn="ctr"/>
+              <a:endParaRPr lang="es-CO"/>
+            </a:p>
+          </p:txBody>
+        </p:sp>
+        <p:cxnSp>
+          <p:nvCxnSpPr>
+            <p:cNvPr id="44" name="Conector recto 43">
+              <a:extLst>
+                <a:ext uri="{FF2B5EF4-FFF2-40B4-BE49-F238E27FC236}">
+                  <a16:creationId xmlns:a16="http://schemas.microsoft.com/office/drawing/2014/main" id="{4C31321C-939B-4CC5-BE5A-E5FF1ABB32F9}"/>
+                </a:ext>
+              </a:extLst>
+            </p:cNvPr>
+            <p:cNvCxnSpPr>
+              <a:stCxn id="43" idx="3"/>
+            </p:cNvCxnSpPr>
+            <p:nvPr/>
+          </p:nvCxnSpPr>
+          <p:spPr>
+            <a:xfrm flipH="1">
+              <a:off x="8256104" y="1721117"/>
+              <a:ext cx="1450033" cy="743787"/>
+            </a:xfrm>
+            <a:prstGeom prst="line">
+              <a:avLst/>
+            </a:prstGeom>
+          </p:spPr>
+          <p:style>
+            <a:lnRef idx="1">
+              <a:schemeClr val="accent1"/>
+            </a:lnRef>
+            <a:fillRef idx="0">
+              <a:schemeClr val="accent1"/>
+            </a:fillRef>
+            <a:effectRef idx="0">
+              <a:schemeClr val="accent1"/>
+            </a:effectRef>
+            <a:fontRef idx="minor">
+              <a:schemeClr val="tx1"/>
+            </a:fontRef>
+          </p:style>
+        </p:cxnSp>
+        <p:sp>
+          <p:nvSpPr>
+            <p:cNvPr id="46" name="Elipse 45">
+              <a:extLst>
+                <a:ext uri="{FF2B5EF4-FFF2-40B4-BE49-F238E27FC236}">
+                  <a16:creationId xmlns:a16="http://schemas.microsoft.com/office/drawing/2014/main" id="{347FC539-ED4A-4AD8-AE35-D0E111D6F9E8}"/>
+                </a:ext>
+              </a:extLst>
+            </p:cNvPr>
+            <p:cNvSpPr/>
+            <p:nvPr/>
+          </p:nvSpPr>
+          <p:spPr>
+            <a:xfrm>
+              <a:off x="8024193" y="2471530"/>
+              <a:ext cx="490331" cy="463826"/>
+            </a:xfrm>
+            <a:prstGeom prst="ellipse">
+              <a:avLst/>
+            </a:prstGeom>
+            <a:noFill/>
+          </p:spPr>
+          <p:style>
+            <a:lnRef idx="2">
+              <a:schemeClr val="accent1">
+                <a:shade val="50000"/>
+              </a:schemeClr>
+            </a:lnRef>
+            <a:fillRef idx="1">
+              <a:schemeClr val="accent1"/>
+            </a:fillRef>
+            <a:effectRef idx="0">
+              <a:schemeClr val="accent1"/>
+            </a:effectRef>
+            <a:fontRef idx="minor">
+              <a:schemeClr val="lt1"/>
+            </a:fontRef>
+          </p:style>
+          <p:txBody>
+            <a:bodyPr rtlCol="0" anchor="ctr"/>
+            <a:lstStyle/>
+            <a:p>
+              <a:pPr algn="ctr"/>
+              <a:endParaRPr lang="es-CO"/>
+            </a:p>
+          </p:txBody>
+        </p:sp>
+        <p:sp>
+          <p:nvSpPr>
+            <p:cNvPr id="47" name="Elipse 46">
+              <a:extLst>
+                <a:ext uri="{FF2B5EF4-FFF2-40B4-BE49-F238E27FC236}">
+                  <a16:creationId xmlns:a16="http://schemas.microsoft.com/office/drawing/2014/main" id="{75C578D5-9900-4CFC-A3FC-36C234B5D509}"/>
+                </a:ext>
+              </a:extLst>
+            </p:cNvPr>
+            <p:cNvSpPr/>
+            <p:nvPr/>
+          </p:nvSpPr>
+          <p:spPr>
+            <a:xfrm>
+              <a:off x="11145082" y="2372141"/>
+              <a:ext cx="490331" cy="463826"/>
+            </a:xfrm>
+            <a:prstGeom prst="ellipse">
+              <a:avLst/>
+            </a:prstGeom>
+            <a:noFill/>
+          </p:spPr>
+          <p:style>
+            <a:lnRef idx="2">
+              <a:schemeClr val="accent1">
+                <a:shade val="50000"/>
+              </a:schemeClr>
+            </a:lnRef>
+            <a:fillRef idx="1">
+              <a:schemeClr val="accent1"/>
+            </a:fillRef>
+            <a:effectRef idx="0">
+              <a:schemeClr val="accent1"/>
+            </a:effectRef>
+            <a:fontRef idx="minor">
+              <a:schemeClr val="lt1"/>
+            </a:fontRef>
+          </p:style>
+          <p:txBody>
+            <a:bodyPr rtlCol="0" anchor="ctr"/>
+            <a:lstStyle/>
+            <a:p>
+              <a:pPr algn="ctr"/>
+              <a:endParaRPr lang="es-CO"/>
+            </a:p>
+          </p:txBody>
+        </p:sp>
+      </p:grpSp>
+      <p:grpSp>
+        <p:nvGrpSpPr>
+          <p:cNvPr id="8" name="Grupo 7">
+            <a:extLst>
+              <a:ext uri="{FF2B5EF4-FFF2-40B4-BE49-F238E27FC236}">
+                <a16:creationId xmlns:a16="http://schemas.microsoft.com/office/drawing/2014/main" id="{B3491BFF-3BC1-42B6-AE2A-61F07461A0EE}"/>
+              </a:ext>
+            </a:extLst>
+          </p:cNvPr>
+          <p:cNvGrpSpPr/>
+          <p:nvPr/>
+        </p:nvGrpSpPr>
+        <p:grpSpPr>
+          <a:xfrm rot="10800000">
+            <a:off x="7579694" y="4022034"/>
+            <a:ext cx="3611219" cy="1610139"/>
+            <a:chOff x="8104425" y="1325217"/>
+            <a:chExt cx="3611219" cy="1610139"/>
+          </a:xfrm>
+        </p:grpSpPr>
+        <p:sp>
+          <p:nvSpPr>
+            <p:cNvPr id="32" name="Elipse 31">
+              <a:extLst>
+                <a:ext uri="{FF2B5EF4-FFF2-40B4-BE49-F238E27FC236}">
+                  <a16:creationId xmlns:a16="http://schemas.microsoft.com/office/drawing/2014/main" id="{F2F9B1BF-0939-4184-9984-1BFF66C8080A}"/>
+                </a:ext>
+              </a:extLst>
+            </p:cNvPr>
+            <p:cNvSpPr/>
+            <p:nvPr/>
+          </p:nvSpPr>
+          <p:spPr>
+            <a:xfrm>
+              <a:off x="9634330" y="1325217"/>
+              <a:ext cx="490331" cy="463826"/>
+            </a:xfrm>
+            <a:prstGeom prst="ellipse">
+              <a:avLst/>
+            </a:prstGeom>
+            <a:noFill/>
+          </p:spPr>
+          <p:style>
+            <a:lnRef idx="2">
+              <a:schemeClr val="accent1">
+                <a:shade val="50000"/>
+              </a:schemeClr>
+            </a:lnRef>
+            <a:fillRef idx="1">
+              <a:schemeClr val="accent1"/>
+            </a:fillRef>
+            <a:effectRef idx="0">
+              <a:schemeClr val="accent1"/>
+            </a:effectRef>
+            <a:fontRef idx="minor">
+              <a:schemeClr val="lt1"/>
+            </a:fontRef>
+          </p:style>
+          <p:txBody>
+            <a:bodyPr rtlCol="0" anchor="ctr"/>
+            <a:lstStyle/>
+            <a:p>
+              <a:pPr algn="ctr"/>
+              <a:endParaRPr lang="es-CO"/>
+            </a:p>
+          </p:txBody>
+        </p:sp>
+        <p:sp>
+          <p:nvSpPr>
+            <p:cNvPr id="35" name="Elipse 34">
+              <a:extLst>
+                <a:ext uri="{FF2B5EF4-FFF2-40B4-BE49-F238E27FC236}">
+                  <a16:creationId xmlns:a16="http://schemas.microsoft.com/office/drawing/2014/main" id="{A6146339-9686-4B38-8F6D-030A9D7BB004}"/>
+                </a:ext>
+              </a:extLst>
+            </p:cNvPr>
+            <p:cNvSpPr/>
+            <p:nvPr/>
+          </p:nvSpPr>
+          <p:spPr>
+            <a:xfrm>
+              <a:off x="8104425" y="2471530"/>
+              <a:ext cx="490331" cy="463826"/>
+            </a:xfrm>
+            <a:prstGeom prst="ellipse">
+              <a:avLst/>
+            </a:prstGeom>
+            <a:noFill/>
+          </p:spPr>
+          <p:style>
+            <a:lnRef idx="2">
+              <a:schemeClr val="accent1">
+                <a:shade val="50000"/>
+              </a:schemeClr>
+            </a:lnRef>
+            <a:fillRef idx="1">
+              <a:schemeClr val="accent1"/>
+            </a:fillRef>
+            <a:effectRef idx="0">
+              <a:schemeClr val="accent1"/>
+            </a:effectRef>
+            <a:fontRef idx="minor">
+              <a:schemeClr val="lt1"/>
+            </a:fontRef>
+          </p:style>
+          <p:txBody>
+            <a:bodyPr rtlCol="0" anchor="ctr"/>
+            <a:lstStyle/>
+            <a:p>
+              <a:pPr algn="ctr"/>
+              <a:endParaRPr lang="es-CO"/>
+            </a:p>
+          </p:txBody>
+        </p:sp>
+        <p:sp>
+          <p:nvSpPr>
+            <p:cNvPr id="36" name="Elipse 35">
+              <a:extLst>
+                <a:ext uri="{FF2B5EF4-FFF2-40B4-BE49-F238E27FC236}">
+                  <a16:creationId xmlns:a16="http://schemas.microsoft.com/office/drawing/2014/main" id="{CB63D7C7-CF74-44B2-8760-3CF3BC210B7A}"/>
+                </a:ext>
+              </a:extLst>
+            </p:cNvPr>
+            <p:cNvSpPr/>
+            <p:nvPr/>
+          </p:nvSpPr>
+          <p:spPr>
+            <a:xfrm>
+              <a:off x="11225314" y="2372141"/>
+              <a:ext cx="490330" cy="463826"/>
+            </a:xfrm>
+            <a:prstGeom prst="ellipse">
+              <a:avLst/>
+            </a:prstGeom>
+            <a:noFill/>
+          </p:spPr>
+          <p:style>
+            <a:lnRef idx="2">
+              <a:schemeClr val="accent1">
+                <a:shade val="50000"/>
+              </a:schemeClr>
+            </a:lnRef>
+            <a:fillRef idx="1">
+              <a:schemeClr val="accent1"/>
+            </a:fillRef>
+            <a:effectRef idx="0">
+              <a:schemeClr val="accent1"/>
+            </a:effectRef>
+            <a:fontRef idx="minor">
+              <a:schemeClr val="lt1"/>
+            </a:fontRef>
+          </p:style>
+          <p:txBody>
+            <a:bodyPr rtlCol="0" anchor="ctr"/>
+            <a:lstStyle/>
+            <a:p>
+              <a:pPr algn="ctr"/>
+              <a:endParaRPr lang="es-CO"/>
+            </a:p>
+          </p:txBody>
+        </p:sp>
+      </p:grpSp>
+      <p:sp>
+        <p:nvSpPr>
+          <p:cNvPr id="11" name="CuadroTexto 10">
+            <a:extLst>
+              <a:ext uri="{FF2B5EF4-FFF2-40B4-BE49-F238E27FC236}">
+                <a16:creationId xmlns:a16="http://schemas.microsoft.com/office/drawing/2014/main" id="{361480D1-177E-4502-9236-29EDAE96AC77}"/>
+              </a:ext>
+            </a:extLst>
+          </p:cNvPr>
+          <p:cNvSpPr txBox="1"/>
+          <p:nvPr/>
+        </p:nvSpPr>
+        <p:spPr>
+          <a:xfrm>
+            <a:off x="9283441" y="1374451"/>
+            <a:ext cx="256906" cy="646331"/>
+          </a:xfrm>
+          <a:prstGeom prst="rect">
+            <a:avLst/>
+          </a:prstGeom>
+          <a:noFill/>
+        </p:spPr>
+        <p:txBody>
+          <a:bodyPr wrap="square" rtlCol="0">
+            <a:spAutoFit/>
+          </a:bodyPr>
+          <a:lstStyle/>
+          <a:p>
+            <a:r>
+              <a:rPr lang="es-CO" dirty="0"/>
+              <a:t>u</a:t>
+            </a:r>
+          </a:p>
+          <a:p>
+            <a:endParaRPr lang="es-CO" dirty="0"/>
+          </a:p>
+        </p:txBody>
+      </p:sp>
+      <p:sp>
+        <p:nvSpPr>
+          <p:cNvPr id="12" name="CuadroTexto 11">
+            <a:extLst>
+              <a:ext uri="{FF2B5EF4-FFF2-40B4-BE49-F238E27FC236}">
+                <a16:creationId xmlns:a16="http://schemas.microsoft.com/office/drawing/2014/main" id="{912A6F60-EA73-4EF7-A87E-737B0303EC3A}"/>
+              </a:ext>
+            </a:extLst>
+          </p:cNvPr>
+          <p:cNvSpPr txBox="1"/>
+          <p:nvPr/>
+        </p:nvSpPr>
+        <p:spPr>
+          <a:xfrm>
+            <a:off x="9261637" y="5184434"/>
+            <a:ext cx="256906" cy="369332"/>
+          </a:xfrm>
+          <a:prstGeom prst="rect">
+            <a:avLst/>
+          </a:prstGeom>
+          <a:noFill/>
+        </p:spPr>
+        <p:txBody>
+          <a:bodyPr wrap="square" rtlCol="0">
+            <a:spAutoFit/>
+          </a:bodyPr>
+          <a:lstStyle/>
+          <a:p>
+            <a:r>
+              <a:rPr lang="es-CO" dirty="0"/>
+              <a:t>v</a:t>
+            </a:r>
+          </a:p>
+        </p:txBody>
+      </p:sp>
+      <p:sp>
+        <p:nvSpPr>
+          <p:cNvPr id="13" name="CuadroTexto 12">
+            <a:extLst>
+              <a:ext uri="{FF2B5EF4-FFF2-40B4-BE49-F238E27FC236}">
+                <a16:creationId xmlns:a16="http://schemas.microsoft.com/office/drawing/2014/main" id="{1DCFED14-09B5-4442-AA04-85E14276EFC6}"/>
+              </a:ext>
+            </a:extLst>
+          </p:cNvPr>
+          <p:cNvSpPr txBox="1"/>
+          <p:nvPr/>
+        </p:nvSpPr>
+        <p:spPr>
+          <a:xfrm>
+            <a:off x="7749121" y="1557130"/>
+            <a:ext cx="1134145" cy="369332"/>
+          </a:xfrm>
+          <a:prstGeom prst="rect">
+            <a:avLst/>
+          </a:prstGeom>
+          <a:noFill/>
+        </p:spPr>
+        <p:txBody>
+          <a:bodyPr wrap="square" rtlCol="0">
+            <a:spAutoFit/>
+          </a:bodyPr>
+          <a:lstStyle/>
+          <a:p>
+            <a:r>
+              <a:rPr lang="es-CO" dirty="0"/>
+              <a:t>trancón</a:t>
+            </a:r>
+          </a:p>
+        </p:txBody>
+      </p:sp>
+      <p:sp>
+        <p:nvSpPr>
+          <p:cNvPr id="14" name="CuadroTexto 13">
+            <a:extLst>
+              <a:ext uri="{FF2B5EF4-FFF2-40B4-BE49-F238E27FC236}">
+                <a16:creationId xmlns:a16="http://schemas.microsoft.com/office/drawing/2014/main" id="{23ED0A28-DBDC-41CE-8858-31C202A16AE4}"/>
+              </a:ext>
+            </a:extLst>
+          </p:cNvPr>
+          <p:cNvSpPr txBox="1"/>
+          <p:nvPr/>
+        </p:nvSpPr>
+        <p:spPr>
+          <a:xfrm>
+            <a:off x="7450160" y="4891608"/>
+            <a:ext cx="1493030" cy="369332"/>
+          </a:xfrm>
+          <a:prstGeom prst="rect">
+            <a:avLst/>
+          </a:prstGeom>
+          <a:noFill/>
+        </p:spPr>
+        <p:txBody>
+          <a:bodyPr wrap="square" rtlCol="0">
+            <a:spAutoFit/>
+          </a:bodyPr>
+          <a:lstStyle/>
+          <a:p>
+            <a:r>
+              <a:rPr lang="es-CO" dirty="0"/>
+              <a:t>Sin trancón</a:t>
+            </a:r>
+          </a:p>
+        </p:txBody>
+      </p:sp>
+      <p:sp>
+        <p:nvSpPr>
+          <p:cNvPr id="15" name="CuadroTexto 14">
+            <a:extLst>
+              <a:ext uri="{FF2B5EF4-FFF2-40B4-BE49-F238E27FC236}">
+                <a16:creationId xmlns:a16="http://schemas.microsoft.com/office/drawing/2014/main" id="{E2F7C707-CBE8-4111-B980-18D89EB38367}"/>
+              </a:ext>
+            </a:extLst>
+          </p:cNvPr>
+          <p:cNvSpPr txBox="1"/>
+          <p:nvPr/>
+        </p:nvSpPr>
+        <p:spPr>
+          <a:xfrm>
+            <a:off x="10140244" y="4802155"/>
+            <a:ext cx="1134145" cy="369332"/>
+          </a:xfrm>
+          <a:prstGeom prst="rect">
+            <a:avLst/>
+          </a:prstGeom>
+          <a:noFill/>
+        </p:spPr>
+        <p:txBody>
+          <a:bodyPr wrap="square" rtlCol="0">
+            <a:spAutoFit/>
+          </a:bodyPr>
+          <a:lstStyle/>
+          <a:p>
+            <a:r>
+              <a:rPr lang="es-CO" dirty="0"/>
+              <a:t>trancón</a:t>
+            </a:r>
+          </a:p>
+        </p:txBody>
+      </p:sp>
+      <p:cxnSp>
+        <p:nvCxnSpPr>
+          <p:cNvPr id="49" name="Conector recto 48">
+            <a:extLst>
+              <a:ext uri="{FF2B5EF4-FFF2-40B4-BE49-F238E27FC236}">
+                <a16:creationId xmlns:a16="http://schemas.microsoft.com/office/drawing/2014/main" id="{40C1E4DB-4589-4493-A445-4B586A5AC7BE}"/>
+              </a:ext>
+            </a:extLst>
+          </p:cNvPr>
+          <p:cNvCxnSpPr>
+            <a:cxnSpLocks/>
+          </p:cNvCxnSpPr>
+          <p:nvPr/>
+        </p:nvCxnSpPr>
+        <p:spPr>
+          <a:xfrm>
+            <a:off x="7786759" y="2935356"/>
+            <a:ext cx="0" cy="1186067"/>
+          </a:xfrm>
+          <a:prstGeom prst="line">
+            <a:avLst/>
+          </a:prstGeom>
+        </p:spPr>
+        <p:style>
+          <a:lnRef idx="1">
+            <a:schemeClr val="accent1"/>
+          </a:lnRef>
+          <a:fillRef idx="0">
+            <a:schemeClr val="accent1"/>
+          </a:fillRef>
+          <a:effectRef idx="0">
+            <a:schemeClr val="accent1"/>
+          </a:effectRef>
+          <a:fontRef idx="minor">
+            <a:schemeClr val="tx1"/>
+          </a:fontRef>
+        </p:style>
+      </p:cxnSp>
+      <p:sp>
+        <p:nvSpPr>
+          <p:cNvPr id="55" name="CuadroTexto 54">
+            <a:extLst>
+              <a:ext uri="{FF2B5EF4-FFF2-40B4-BE49-F238E27FC236}">
+                <a16:creationId xmlns:a16="http://schemas.microsoft.com/office/drawing/2014/main" id="{82FC2249-5008-431A-8D8F-71A49DF17381}"/>
+              </a:ext>
+            </a:extLst>
+          </p:cNvPr>
+          <p:cNvSpPr txBox="1"/>
+          <p:nvPr/>
+        </p:nvSpPr>
+        <p:spPr>
+          <a:xfrm>
+            <a:off x="6798365" y="3309641"/>
+            <a:ext cx="1134145" cy="369332"/>
+          </a:xfrm>
+          <a:prstGeom prst="rect">
+            <a:avLst/>
+          </a:prstGeom>
+          <a:noFill/>
+        </p:spPr>
+        <p:txBody>
+          <a:bodyPr wrap="square" rtlCol="0">
+            <a:spAutoFit/>
+          </a:bodyPr>
+          <a:lstStyle/>
+          <a:p>
+            <a:r>
+              <a:rPr lang="es-CO" dirty="0"/>
+              <a:t>trancón</a:t>
+            </a:r>
+          </a:p>
+        </p:txBody>
+      </p:sp>
+      <p:sp>
+        <p:nvSpPr>
+          <p:cNvPr id="56" name="CuadroTexto 55">
+            <a:extLst>
+              <a:ext uri="{FF2B5EF4-FFF2-40B4-BE49-F238E27FC236}">
+                <a16:creationId xmlns:a16="http://schemas.microsoft.com/office/drawing/2014/main" id="{EFB8605F-A87C-4363-A9A5-304EF963A079}"/>
+              </a:ext>
+            </a:extLst>
+          </p:cNvPr>
+          <p:cNvSpPr txBox="1"/>
+          <p:nvPr/>
+        </p:nvSpPr>
+        <p:spPr>
+          <a:xfrm>
+            <a:off x="9909493" y="1568189"/>
+            <a:ext cx="1493030" cy="369332"/>
+          </a:xfrm>
+          <a:prstGeom prst="rect">
+            <a:avLst/>
+          </a:prstGeom>
+          <a:noFill/>
+        </p:spPr>
+        <p:txBody>
+          <a:bodyPr wrap="square" rtlCol="0">
+            <a:spAutoFit/>
+          </a:bodyPr>
+          <a:lstStyle/>
+          <a:p>
+            <a:r>
+              <a:rPr lang="es-CO" dirty="0"/>
+              <a:t>Sin trancón</a:t>
+            </a:r>
+          </a:p>
+        </p:txBody>
+      </p:sp>
+      <p:sp>
+        <p:nvSpPr>
+          <p:cNvPr id="57" name="CuadroTexto 56">
+            <a:extLst>
+              <a:ext uri="{FF2B5EF4-FFF2-40B4-BE49-F238E27FC236}">
+                <a16:creationId xmlns:a16="http://schemas.microsoft.com/office/drawing/2014/main" id="{80A423E0-A1F8-4C8A-B6CF-6A2D79950D29}"/>
+              </a:ext>
+            </a:extLst>
+          </p:cNvPr>
+          <p:cNvSpPr txBox="1"/>
+          <p:nvPr/>
+        </p:nvSpPr>
+        <p:spPr>
+          <a:xfrm>
+            <a:off x="10861289" y="3194251"/>
+            <a:ext cx="1493030" cy="369332"/>
+          </a:xfrm>
+          <a:prstGeom prst="rect">
+            <a:avLst/>
+          </a:prstGeom>
+          <a:noFill/>
+        </p:spPr>
+        <p:txBody>
+          <a:bodyPr wrap="square" rtlCol="0">
+            <a:spAutoFit/>
+          </a:bodyPr>
+          <a:lstStyle/>
+          <a:p>
+            <a:r>
+              <a:rPr lang="es-CO" dirty="0"/>
+              <a:t>Sin trancón</a:t>
+            </a:r>
+          </a:p>
+        </p:txBody>
+      </p:sp>
+      <p:sp>
+        <p:nvSpPr>
+          <p:cNvPr id="69" name="CuadroTexto 68">
+            <a:extLst>
+              <a:ext uri="{FF2B5EF4-FFF2-40B4-BE49-F238E27FC236}">
+                <a16:creationId xmlns:a16="http://schemas.microsoft.com/office/drawing/2014/main" id="{8C676580-4C5F-4BE6-B4FF-A5BAC4EEA676}"/>
+              </a:ext>
+            </a:extLst>
+          </p:cNvPr>
+          <p:cNvSpPr txBox="1"/>
+          <p:nvPr/>
+        </p:nvSpPr>
+        <p:spPr>
+          <a:xfrm>
+            <a:off x="2178003" y="2020782"/>
+            <a:ext cx="4399358" cy="1631216"/>
+          </a:xfrm>
+          <a:prstGeom prst="rect">
+            <a:avLst/>
+          </a:prstGeom>
+          <a:noFill/>
+        </p:spPr>
+        <p:txBody>
+          <a:bodyPr wrap="square" rtlCol="0">
+            <a:spAutoFit/>
+          </a:bodyPr>
+          <a:lstStyle/>
+          <a:p>
+            <a:r>
+              <a:rPr lang="es-CO" sz="2000" dirty="0"/>
+              <a:t>En cambio, el camino azul podría ser una posibilidad para moverse del punto u al v, ya que la persona solo estaría tolerando un trancón.</a:t>
+            </a:r>
+            <a:endParaRPr lang="es-CO" sz="2000" b="1" dirty="0"/>
+          </a:p>
+        </p:txBody>
+      </p:sp>
+      <p:cxnSp>
+        <p:nvCxnSpPr>
+          <p:cNvPr id="25" name="Conector recto 24">
+            <a:extLst>
+              <a:ext uri="{FF2B5EF4-FFF2-40B4-BE49-F238E27FC236}">
+                <a16:creationId xmlns:a16="http://schemas.microsoft.com/office/drawing/2014/main" id="{8BFBEAF6-0173-43E4-A57A-952E5113C8E1}"/>
+              </a:ext>
+            </a:extLst>
+          </p:cNvPr>
+          <p:cNvCxnSpPr>
+            <a:cxnSpLocks/>
+            <a:endCxn id="23" idx="0"/>
+          </p:cNvCxnSpPr>
+          <p:nvPr/>
+        </p:nvCxnSpPr>
+        <p:spPr>
+          <a:xfrm flipH="1">
+            <a:off x="9398706" y="1812040"/>
+            <a:ext cx="20568" cy="1385047"/>
+          </a:xfrm>
+          <a:prstGeom prst="line">
+            <a:avLst/>
+          </a:prstGeom>
+          <a:ln w="38100">
+            <a:solidFill>
+              <a:srgbClr val="00B0F0"/>
+            </a:solidFill>
+          </a:ln>
+        </p:spPr>
+        <p:style>
+          <a:lnRef idx="1">
+            <a:schemeClr val="accent1"/>
+          </a:lnRef>
+          <a:fillRef idx="0">
+            <a:schemeClr val="accent1"/>
+          </a:fillRef>
+          <a:effectRef idx="0">
+            <a:schemeClr val="accent1"/>
+          </a:effectRef>
+          <a:fontRef idx="minor">
+            <a:schemeClr val="tx1"/>
+          </a:fontRef>
+        </p:style>
+      </p:cxnSp>
+      <p:cxnSp>
+        <p:nvCxnSpPr>
+          <p:cNvPr id="28" name="Conector recto 27">
+            <a:extLst>
+              <a:ext uri="{FF2B5EF4-FFF2-40B4-BE49-F238E27FC236}">
+                <a16:creationId xmlns:a16="http://schemas.microsoft.com/office/drawing/2014/main" id="{6B071E88-9A15-4580-9E16-4114603C5ED0}"/>
+              </a:ext>
+            </a:extLst>
+          </p:cNvPr>
+          <p:cNvCxnSpPr>
+            <a:cxnSpLocks/>
+          </p:cNvCxnSpPr>
+          <p:nvPr/>
+        </p:nvCxnSpPr>
+        <p:spPr>
+          <a:xfrm>
+            <a:off x="9570254" y="1721117"/>
+            <a:ext cx="1164035" cy="718950"/>
+          </a:xfrm>
+          <a:prstGeom prst="line">
+            <a:avLst/>
+          </a:prstGeom>
+        </p:spPr>
+        <p:style>
+          <a:lnRef idx="1">
+            <a:schemeClr val="accent1"/>
+          </a:lnRef>
+          <a:fillRef idx="0">
+            <a:schemeClr val="accent1"/>
+          </a:fillRef>
+          <a:effectRef idx="0">
+            <a:schemeClr val="accent1"/>
+          </a:effectRef>
+          <a:fontRef idx="minor">
+            <a:schemeClr val="tx1"/>
+          </a:fontRef>
+        </p:style>
+      </p:cxnSp>
+      <p:cxnSp>
+        <p:nvCxnSpPr>
+          <p:cNvPr id="37" name="Conector recto 36">
+            <a:extLst>
+              <a:ext uri="{FF2B5EF4-FFF2-40B4-BE49-F238E27FC236}">
+                <a16:creationId xmlns:a16="http://schemas.microsoft.com/office/drawing/2014/main" id="{E9215504-953D-469D-9817-A5E1713A5935}"/>
+              </a:ext>
+            </a:extLst>
+          </p:cNvPr>
+          <p:cNvCxnSpPr>
+            <a:cxnSpLocks/>
+          </p:cNvCxnSpPr>
+          <p:nvPr/>
+        </p:nvCxnSpPr>
+        <p:spPr>
+          <a:xfrm flipH="1">
+            <a:off x="10920347" y="2835967"/>
+            <a:ext cx="1" cy="1186067"/>
+          </a:xfrm>
+          <a:prstGeom prst="line">
+            <a:avLst/>
+          </a:prstGeom>
+        </p:spPr>
+        <p:style>
+          <a:lnRef idx="1">
+            <a:schemeClr val="accent1"/>
+          </a:lnRef>
+          <a:fillRef idx="0">
+            <a:schemeClr val="accent1"/>
+          </a:fillRef>
+          <a:effectRef idx="0">
+            <a:schemeClr val="accent1"/>
+          </a:effectRef>
+          <a:fontRef idx="minor">
+            <a:schemeClr val="tx1"/>
+          </a:fontRef>
+        </p:style>
+      </p:cxnSp>
+      <p:cxnSp>
+        <p:nvCxnSpPr>
+          <p:cNvPr id="38" name="Conector recto 37">
+            <a:extLst>
+              <a:ext uri="{FF2B5EF4-FFF2-40B4-BE49-F238E27FC236}">
+                <a16:creationId xmlns:a16="http://schemas.microsoft.com/office/drawing/2014/main" id="{63D08325-B41B-455C-9D8F-E61EF781AA1F}"/>
+              </a:ext>
+            </a:extLst>
+          </p:cNvPr>
+          <p:cNvCxnSpPr>
+            <a:cxnSpLocks/>
+          </p:cNvCxnSpPr>
+          <p:nvPr/>
+        </p:nvCxnSpPr>
+        <p:spPr>
+          <a:xfrm flipV="1">
+            <a:off x="9551101" y="4417934"/>
+            <a:ext cx="1183188" cy="818339"/>
+          </a:xfrm>
+          <a:prstGeom prst="line">
+            <a:avLst/>
+          </a:prstGeom>
+        </p:spPr>
+        <p:style>
+          <a:lnRef idx="1">
+            <a:schemeClr val="accent1"/>
+          </a:lnRef>
+          <a:fillRef idx="0">
+            <a:schemeClr val="accent1"/>
+          </a:fillRef>
+          <a:effectRef idx="0">
+            <a:schemeClr val="accent1"/>
+          </a:effectRef>
+          <a:fontRef idx="minor">
+            <a:schemeClr val="tx1"/>
+          </a:fontRef>
+        </p:style>
+      </p:cxnSp>
+      <p:sp>
+        <p:nvSpPr>
+          <p:cNvPr id="23" name="Diagrama de flujo: conector 22">
+            <a:extLst>
+              <a:ext uri="{FF2B5EF4-FFF2-40B4-BE49-F238E27FC236}">
+                <a16:creationId xmlns:a16="http://schemas.microsoft.com/office/drawing/2014/main" id="{5C83467A-F102-4090-A43C-9308C3847C60}"/>
+              </a:ext>
+            </a:extLst>
+          </p:cNvPr>
+          <p:cNvSpPr/>
+          <p:nvPr/>
+        </p:nvSpPr>
+        <p:spPr>
+          <a:xfrm>
+            <a:off x="9153541" y="3197087"/>
+            <a:ext cx="490329" cy="463826"/>
+          </a:xfrm>
+          <a:prstGeom prst="flowChartConnector">
+            <a:avLst/>
+          </a:prstGeom>
+          <a:noFill/>
+        </p:spPr>
+        <p:style>
+          <a:lnRef idx="2">
+            <a:schemeClr val="accent1">
+              <a:shade val="50000"/>
+            </a:schemeClr>
+          </a:lnRef>
+          <a:fillRef idx="1">
+            <a:schemeClr val="accent1"/>
+          </a:fillRef>
+          <a:effectRef idx="0">
+            <a:schemeClr val="accent1"/>
+          </a:effectRef>
+          <a:fontRef idx="minor">
+            <a:schemeClr val="lt1"/>
+          </a:fontRef>
+        </p:style>
+        <p:txBody>
+          <a:bodyPr rtlCol="0" anchor="ctr"/>
+          <a:lstStyle/>
+          <a:p>
+            <a:pPr algn="ctr"/>
+            <a:endParaRPr lang="es-CO"/>
+          </a:p>
+        </p:txBody>
+      </p:sp>
+      <p:cxnSp>
+        <p:nvCxnSpPr>
+          <p:cNvPr id="58" name="Conector recto 57">
+            <a:extLst>
+              <a:ext uri="{FF2B5EF4-FFF2-40B4-BE49-F238E27FC236}">
+                <a16:creationId xmlns:a16="http://schemas.microsoft.com/office/drawing/2014/main" id="{1EF31926-71D1-49AF-A37A-23D92F9FF205}"/>
+              </a:ext>
+            </a:extLst>
+          </p:cNvPr>
+          <p:cNvCxnSpPr>
+            <a:cxnSpLocks/>
+            <a:stCxn id="23" idx="4"/>
+            <a:endCxn id="12" idx="0"/>
+          </p:cNvCxnSpPr>
+          <p:nvPr/>
+        </p:nvCxnSpPr>
+        <p:spPr>
+          <a:xfrm flipH="1">
+            <a:off x="9390090" y="3660913"/>
+            <a:ext cx="8616" cy="1523521"/>
+          </a:xfrm>
+          <a:prstGeom prst="line">
+            <a:avLst/>
+          </a:prstGeom>
+        </p:spPr>
+        <p:style>
+          <a:lnRef idx="1">
+            <a:schemeClr val="accent1"/>
+          </a:lnRef>
+          <a:fillRef idx="0">
+            <a:schemeClr val="accent1"/>
+          </a:fillRef>
+          <a:effectRef idx="0">
+            <a:schemeClr val="accent1"/>
+          </a:effectRef>
+          <a:fontRef idx="minor">
+            <a:schemeClr val="tx1"/>
+          </a:fontRef>
+        </p:style>
+      </p:cxnSp>
+      <p:sp>
+        <p:nvSpPr>
+          <p:cNvPr id="66" name="CuadroTexto 65">
+            <a:extLst>
+              <a:ext uri="{FF2B5EF4-FFF2-40B4-BE49-F238E27FC236}">
+                <a16:creationId xmlns:a16="http://schemas.microsoft.com/office/drawing/2014/main" id="{CC9B6CEE-8277-47BF-A825-F6D752DB9FFC}"/>
+              </a:ext>
+            </a:extLst>
+          </p:cNvPr>
+          <p:cNvSpPr txBox="1"/>
+          <p:nvPr/>
+        </p:nvSpPr>
+        <p:spPr>
+          <a:xfrm>
+            <a:off x="8193516" y="2763799"/>
+            <a:ext cx="1447046" cy="338554"/>
+          </a:xfrm>
+          <a:prstGeom prst="rect">
+            <a:avLst/>
+          </a:prstGeom>
+          <a:noFill/>
+        </p:spPr>
+        <p:txBody>
+          <a:bodyPr wrap="square" rtlCol="0">
+            <a:spAutoFit/>
+          </a:bodyPr>
+          <a:lstStyle/>
+          <a:p>
+            <a:r>
+              <a:rPr lang="es-CO" sz="1600" dirty="0"/>
+              <a:t>Sin trancón</a:t>
+            </a:r>
+          </a:p>
+        </p:txBody>
+      </p:sp>
+      <p:sp>
+        <p:nvSpPr>
+          <p:cNvPr id="67" name="CuadroTexto 66">
+            <a:extLst>
+              <a:ext uri="{FF2B5EF4-FFF2-40B4-BE49-F238E27FC236}">
+                <a16:creationId xmlns:a16="http://schemas.microsoft.com/office/drawing/2014/main" id="{DAF59D5D-5CBF-4D45-A4A5-11B9474843A9}"/>
+              </a:ext>
+            </a:extLst>
+          </p:cNvPr>
+          <p:cNvSpPr txBox="1"/>
+          <p:nvPr/>
+        </p:nvSpPr>
+        <p:spPr>
+          <a:xfrm>
+            <a:off x="8376117" y="3782605"/>
+            <a:ext cx="1134145" cy="369332"/>
+          </a:xfrm>
+          <a:prstGeom prst="rect">
+            <a:avLst/>
+          </a:prstGeom>
+          <a:noFill/>
+        </p:spPr>
+        <p:txBody>
+          <a:bodyPr wrap="square" rtlCol="0">
+            <a:spAutoFit/>
+          </a:bodyPr>
+          <a:lstStyle/>
+          <a:p>
+            <a:r>
+              <a:rPr lang="es-CO" dirty="0"/>
+              <a:t>trancón</a:t>
+            </a:r>
+          </a:p>
+        </p:txBody>
+      </p:sp>
+      <p:cxnSp>
+        <p:nvCxnSpPr>
+          <p:cNvPr id="40" name="Conector recto 39">
+            <a:extLst>
+              <a:ext uri="{FF2B5EF4-FFF2-40B4-BE49-F238E27FC236}">
+                <a16:creationId xmlns:a16="http://schemas.microsoft.com/office/drawing/2014/main" id="{7C1BF102-A9B3-4FF7-B27C-E4CF771C6A23}"/>
+              </a:ext>
+            </a:extLst>
+          </p:cNvPr>
+          <p:cNvCxnSpPr>
+            <a:cxnSpLocks/>
+            <a:endCxn id="12" idx="0"/>
+          </p:cNvCxnSpPr>
+          <p:nvPr/>
+        </p:nvCxnSpPr>
+        <p:spPr>
+          <a:xfrm flipH="1">
+            <a:off x="9390090" y="3691227"/>
+            <a:ext cx="17008" cy="1493207"/>
+          </a:xfrm>
+          <a:prstGeom prst="line">
+            <a:avLst/>
+          </a:prstGeom>
+          <a:ln w="38100">
+            <a:solidFill>
+              <a:srgbClr val="00B0F0"/>
+            </a:solidFill>
+          </a:ln>
+        </p:spPr>
+        <p:style>
+          <a:lnRef idx="1">
+            <a:schemeClr val="accent1"/>
+          </a:lnRef>
+          <a:fillRef idx="0">
+            <a:schemeClr val="accent1"/>
+          </a:fillRef>
+          <a:effectRef idx="0">
+            <a:schemeClr val="accent1"/>
+          </a:effectRef>
+          <a:fontRef idx="minor">
+            <a:schemeClr val="tx1"/>
+          </a:fontRef>
+        </p:style>
+      </p:cxnSp>
+      <p:cxnSp>
+        <p:nvCxnSpPr>
+          <p:cNvPr id="41" name="Conector recto 40">
+            <a:extLst>
+              <a:ext uri="{FF2B5EF4-FFF2-40B4-BE49-F238E27FC236}">
+                <a16:creationId xmlns:a16="http://schemas.microsoft.com/office/drawing/2014/main" id="{37574EFD-95DC-4790-921C-2D9F82DBF352}"/>
+              </a:ext>
+            </a:extLst>
+          </p:cNvPr>
+          <p:cNvCxnSpPr>
+            <a:cxnSpLocks/>
+            <a:stCxn id="36" idx="1"/>
+          </p:cNvCxnSpPr>
+          <p:nvPr/>
+        </p:nvCxnSpPr>
+        <p:spPr>
+          <a:xfrm>
+            <a:off x="7998217" y="4517323"/>
+            <a:ext cx="1270699" cy="718950"/>
+          </a:xfrm>
+          <a:prstGeom prst="line">
+            <a:avLst/>
+          </a:prstGeom>
+        </p:spPr>
+        <p:style>
+          <a:lnRef idx="1">
+            <a:schemeClr val="accent1"/>
+          </a:lnRef>
+          <a:fillRef idx="0">
+            <a:schemeClr val="accent1"/>
+          </a:fillRef>
+          <a:effectRef idx="0">
+            <a:schemeClr val="accent1"/>
+          </a:effectRef>
+          <a:fontRef idx="minor">
+            <a:schemeClr val="tx1"/>
+          </a:fontRef>
+        </p:style>
+      </p:cxnSp>
+    </p:spTree>
+    <p:extLst>
+      <p:ext uri="{BB962C8B-B14F-4D97-AF65-F5344CB8AC3E}">
+        <p14:creationId xmlns:p14="http://schemas.microsoft.com/office/powerpoint/2010/main" val="4106420998"/>
       </p:ext>
     </p:extLst>
   </p:cSld>

</xml_diff>